<commit_message>
- Week 8.1 content
</commit_message>
<xml_diff>
--- a/lectures/week8/lecture1/slides/week8_lecture1.pptx
+++ b/lectures/week8/lecture1/slides/week8_lecture1.pptx
@@ -2,7 +2,7 @@
 <file path=ppt/presentation.xml><?xml version="1.0" encoding="utf-8"?>
 <p:presentation xmlns:a="http://schemas.openxmlformats.org/drawingml/2006/main" xmlns:r="http://schemas.openxmlformats.org/officeDocument/2006/relationships" xmlns:p="http://schemas.openxmlformats.org/presentationml/2006/main" saveSubsetFonts="1">
   <p:sldMasterIdLst>
-    <p:sldMasterId id="2147483665" r:id="rId1"/>
+    <p:sldMasterId id="2147483670" r:id="rId1"/>
   </p:sldMasterIdLst>
   <p:sldIdLst>
     <p:sldId id="256" r:id="rId2"/>
@@ -201,7 +201,7 @@
           <p:cNvPr id="2" name="Title 1">
             <a:extLst>
               <a:ext uri="{FF2B5EF4-FFF2-40B4-BE49-F238E27FC236}">
-                <a16:creationId xmlns:a16="http://schemas.microsoft.com/office/drawing/2014/main" id="{8C70E9A4-6E61-4AF5-9711-A3D313611356}"/>
+                <a16:creationId xmlns:a16="http://schemas.microsoft.com/office/drawing/2014/main" id="{45F8F638-606D-A22E-8F9F-A4A6D858EDA6}"/>
               </a:ext>
             </a:extLst>
           </p:cNvPr>
@@ -214,17 +214,15 @@
         </p:nvSpPr>
         <p:spPr>
           <a:xfrm>
-            <a:off x="335947" y="2409479"/>
+            <a:off x="335947" y="3285779"/>
             <a:ext cx="11391065" cy="893580"/>
           </a:xfrm>
         </p:spPr>
         <p:txBody>
-          <a:bodyPr anchor="b">
-            <a:normAutofit/>
-          </a:bodyPr>
+          <a:bodyPr/>
           <a:lstStyle>
-            <a:lvl1pPr algn="l">
-              <a:defRPr sz="4800">
+            <a:lvl1pPr>
+              <a:defRPr>
                 <a:solidFill>
                   <a:srgbClr val="FFFFFF"/>
                 </a:solidFill>
@@ -236,7 +234,7 @@
               <a:rPr lang="en-US"/>
               <a:t>Click to edit Master title style</a:t>
             </a:r>
-            <a:endParaRPr lang="en-CA" dirty="0"/>
+            <a:endParaRPr lang="en-US" dirty="0"/>
           </a:p>
         </p:txBody>
       </p:sp>
@@ -245,7 +243,7 @@
           <p:cNvPr id="3" name="Subtitle 2">
             <a:extLst>
               <a:ext uri="{FF2B5EF4-FFF2-40B4-BE49-F238E27FC236}">
-                <a16:creationId xmlns:a16="http://schemas.microsoft.com/office/drawing/2014/main" id="{959B255B-D275-45F6-ACB5-BBD491BB4ADD}"/>
+                <a16:creationId xmlns:a16="http://schemas.microsoft.com/office/drawing/2014/main" id="{4EB4BAB1-A261-2102-CEA9-063F697A42AF}"/>
               </a:ext>
             </a:extLst>
           </p:cNvPr>
@@ -258,70 +256,35 @@
         </p:nvSpPr>
         <p:spPr>
           <a:xfrm>
-            <a:off x="335947" y="3848999"/>
+            <a:off x="335947" y="4553849"/>
             <a:ext cx="11391065" cy="1655762"/>
           </a:xfrm>
-          <a:prstGeom prst="rect">
-            <a:avLst/>
-          </a:prstGeom>
         </p:spPr>
         <p:txBody>
           <a:bodyPr/>
           <a:lstStyle>
-            <a:lvl1pPr marL="0" indent="0" algn="l">
+            <a:lvl1pPr marL="0" indent="0">
               <a:buNone/>
-              <a:defRPr sz="2400">
+              <a:defRPr>
                 <a:solidFill>
                   <a:srgbClr val="FFFFFF"/>
                 </a:solidFill>
               </a:defRPr>
             </a:lvl1pPr>
-            <a:lvl2pPr marL="457200" indent="0" algn="ctr">
-              <a:buNone/>
-              <a:defRPr sz="2000"/>
-            </a:lvl2pPr>
-            <a:lvl3pPr marL="914400" indent="0" algn="ctr">
-              <a:buNone/>
-              <a:defRPr sz="1800"/>
-            </a:lvl3pPr>
-            <a:lvl4pPr marL="1371600" indent="0" algn="ctr">
-              <a:buNone/>
-              <a:defRPr sz="1600"/>
-            </a:lvl4pPr>
-            <a:lvl5pPr marL="1828800" indent="0" algn="ctr">
-              <a:buNone/>
-              <a:defRPr sz="1600"/>
-            </a:lvl5pPr>
-            <a:lvl6pPr marL="2286000" indent="0" algn="ctr">
-              <a:buNone/>
-              <a:defRPr sz="1600"/>
-            </a:lvl6pPr>
-            <a:lvl7pPr marL="2743200" indent="0" algn="ctr">
-              <a:buNone/>
-              <a:defRPr sz="1600"/>
-            </a:lvl7pPr>
-            <a:lvl8pPr marL="3200400" indent="0" algn="ctr">
-              <a:buNone/>
-              <a:defRPr sz="1600"/>
-            </a:lvl8pPr>
-            <a:lvl9pPr marL="3657600" indent="0" algn="ctr">
-              <a:buNone/>
-              <a:defRPr sz="1600"/>
-            </a:lvl9pPr>
           </a:lstStyle>
           <a:p>
             <a:r>
               <a:rPr lang="en-US"/>
               <a:t>Click to edit Master subtitle style</a:t>
             </a:r>
-            <a:endParaRPr lang="en-CA"/>
+            <a:endParaRPr lang="en-US" dirty="0"/>
           </a:p>
         </p:txBody>
       </p:sp>
     </p:spTree>
     <p:extLst>
       <p:ext uri="{BB962C8B-B14F-4D97-AF65-F5344CB8AC3E}">
-        <p14:creationId xmlns:p14="http://schemas.microsoft.com/office/powerpoint/2010/main" val="1898934703"/>
+        <p14:creationId xmlns:p14="http://schemas.microsoft.com/office/powerpoint/2010/main" val="3081796504"/>
       </p:ext>
     </p:extLst>
   </p:cSld>
@@ -428,6 +391,9 @@
           <a:bodyPr/>
           <a:lstStyle>
             <a:lvl1pPr>
+              <a:buClr>
+                <a:schemeClr val="accent2"/>
+              </a:buClr>
               <a:defRPr>
                 <a:solidFill>
                   <a:srgbClr val="444445"/>
@@ -435,6 +401,9 @@
               </a:defRPr>
             </a:lvl1pPr>
             <a:lvl2pPr>
+              <a:buClr>
+                <a:schemeClr val="accent2"/>
+              </a:buClr>
               <a:defRPr>
                 <a:solidFill>
                   <a:srgbClr val="444445"/>
@@ -442,6 +411,9 @@
               </a:defRPr>
             </a:lvl2pPr>
             <a:lvl3pPr>
+              <a:buClr>
+                <a:schemeClr val="accent2"/>
+              </a:buClr>
               <a:defRPr>
                 <a:solidFill>
                   <a:srgbClr val="444445"/>
@@ -449,6 +421,9 @@
               </a:defRPr>
             </a:lvl3pPr>
             <a:lvl4pPr>
+              <a:buClr>
+                <a:schemeClr val="accent2"/>
+              </a:buClr>
               <a:defRPr>
                 <a:solidFill>
                   <a:srgbClr val="444445"/>
@@ -456,6 +431,9 @@
               </a:defRPr>
             </a:lvl4pPr>
             <a:lvl5pPr>
+              <a:buClr>
+                <a:schemeClr val="accent2"/>
+              </a:buClr>
               <a:defRPr>
                 <a:solidFill>
                   <a:srgbClr val="444445"/>
@@ -467,7 +445,7 @@
             <a:pPr lvl="0"/>
             <a:r>
               <a:rPr lang="en-US"/>
-              <a:t>Edit Master text styles</a:t>
+              <a:t>Click to edit Master text styles</a:t>
             </a:r>
           </a:p>
           <a:p>
@@ -497,14 +475,14 @@
               <a:rPr lang="en-US"/>
               <a:t>Fifth level</a:t>
             </a:r>
-            <a:endParaRPr lang="en-CA"/>
+            <a:endParaRPr lang="en-CA" dirty="0"/>
           </a:p>
         </p:txBody>
       </p:sp>
     </p:spTree>
     <p:extLst>
       <p:ext uri="{BB962C8B-B14F-4D97-AF65-F5344CB8AC3E}">
-        <p14:creationId xmlns:p14="http://schemas.microsoft.com/office/powerpoint/2010/main" val="3979519265"/>
+        <p14:creationId xmlns:p14="http://schemas.microsoft.com/office/powerpoint/2010/main" val="3955502942"/>
       </p:ext>
     </p:extLst>
   </p:cSld>
@@ -611,6 +589,9 @@
           <a:bodyPr/>
           <a:lstStyle>
             <a:lvl1pPr>
+              <a:buClr>
+                <a:schemeClr val="accent6"/>
+              </a:buClr>
               <a:defRPr>
                 <a:solidFill>
                   <a:srgbClr val="FFFFFF"/>
@@ -618,6 +599,9 @@
               </a:defRPr>
             </a:lvl1pPr>
             <a:lvl2pPr>
+              <a:buClr>
+                <a:schemeClr val="accent6"/>
+              </a:buClr>
               <a:defRPr>
                 <a:solidFill>
                   <a:srgbClr val="FFFFFF"/>
@@ -625,6 +609,9 @@
               </a:defRPr>
             </a:lvl2pPr>
             <a:lvl3pPr>
+              <a:buClr>
+                <a:schemeClr val="accent6"/>
+              </a:buClr>
               <a:defRPr>
                 <a:solidFill>
                   <a:srgbClr val="FFFFFF"/>
@@ -632,6 +619,9 @@
               </a:defRPr>
             </a:lvl3pPr>
             <a:lvl4pPr>
+              <a:buClr>
+                <a:schemeClr val="accent6"/>
+              </a:buClr>
               <a:defRPr>
                 <a:solidFill>
                   <a:srgbClr val="FFFFFF"/>
@@ -639,6 +629,9 @@
               </a:defRPr>
             </a:lvl4pPr>
             <a:lvl5pPr>
+              <a:buClr>
+                <a:schemeClr val="accent6"/>
+              </a:buClr>
               <a:defRPr>
                 <a:solidFill>
                   <a:srgbClr val="FFFFFF"/>
@@ -650,7 +643,7 @@
             <a:pPr lvl="0"/>
             <a:r>
               <a:rPr lang="en-US"/>
-              <a:t>Edit Master text styles</a:t>
+              <a:t>Click to edit Master text styles</a:t>
             </a:r>
           </a:p>
           <a:p>
@@ -687,7 +680,7 @@
     </p:spTree>
     <p:extLst>
       <p:ext uri="{BB962C8B-B14F-4D97-AF65-F5344CB8AC3E}">
-        <p14:creationId xmlns:p14="http://schemas.microsoft.com/office/powerpoint/2010/main" val="309569737"/>
+        <p14:creationId xmlns:p14="http://schemas.microsoft.com/office/powerpoint/2010/main" val="1379065744"/>
       </p:ext>
     </p:extLst>
   </p:cSld>
@@ -795,7 +788,7 @@
           <a:lstStyle>
             <a:lvl1pPr>
               <a:buClr>
-                <a:schemeClr val="tx1"/>
+                <a:schemeClr val="accent6"/>
               </a:buClr>
               <a:defRPr>
                 <a:solidFill>
@@ -805,7 +798,7 @@
             </a:lvl1pPr>
             <a:lvl2pPr>
               <a:buClr>
-                <a:schemeClr val="tx1"/>
+                <a:schemeClr val="accent6"/>
               </a:buClr>
               <a:defRPr>
                 <a:solidFill>
@@ -815,7 +808,7 @@
             </a:lvl2pPr>
             <a:lvl3pPr>
               <a:buClr>
-                <a:schemeClr val="tx1"/>
+                <a:schemeClr val="accent6"/>
               </a:buClr>
               <a:defRPr>
                 <a:solidFill>
@@ -825,7 +818,7 @@
             </a:lvl3pPr>
             <a:lvl4pPr>
               <a:buClr>
-                <a:schemeClr val="tx1"/>
+                <a:schemeClr val="accent6"/>
               </a:buClr>
               <a:defRPr>
                 <a:solidFill>
@@ -835,7 +828,7 @@
             </a:lvl4pPr>
             <a:lvl5pPr>
               <a:buClr>
-                <a:schemeClr val="tx1"/>
+                <a:schemeClr val="accent6"/>
               </a:buClr>
               <a:defRPr>
                 <a:solidFill>
@@ -848,7 +841,7 @@
             <a:pPr lvl="0"/>
             <a:r>
               <a:rPr lang="en-US"/>
-              <a:t>Edit Master text styles</a:t>
+              <a:t>Click to edit Master text styles</a:t>
             </a:r>
           </a:p>
           <a:p>
@@ -885,7 +878,7 @@
     </p:spTree>
     <p:extLst>
       <p:ext uri="{BB962C8B-B14F-4D97-AF65-F5344CB8AC3E}">
-        <p14:creationId xmlns:p14="http://schemas.microsoft.com/office/powerpoint/2010/main" val="4017234516"/>
+        <p14:creationId xmlns:p14="http://schemas.microsoft.com/office/powerpoint/2010/main" val="2782305238"/>
       </p:ext>
     </p:extLst>
   </p:cSld>
@@ -895,13 +888,13 @@
 </p:sldLayout>
 </file>
 
-<file path=ppt/slideMasters/slideMaster1.xml><?xml version="1.0" encoding="utf-8"?>
-<p:sldMaster xmlns:a="http://schemas.openxmlformats.org/drawingml/2006/main" xmlns:r="http://schemas.openxmlformats.org/officeDocument/2006/relationships" xmlns:p="http://schemas.openxmlformats.org/presentationml/2006/main">
-  <p:cSld>
+<file path=ppt/slideLayouts/slideLayout5.xml><?xml version="1.0" encoding="utf-8"?>
+<p:sldLayout xmlns:a="http://schemas.openxmlformats.org/drawingml/2006/main" xmlns:r="http://schemas.openxmlformats.org/officeDocument/2006/relationships" xmlns:p="http://schemas.openxmlformats.org/presentationml/2006/main" type="obj" preserve="1">
+  <p:cSld name="4_Title and Content">
     <p:bg>
       <p:bgPr>
         <a:blipFill dpi="0" rotWithShape="1">
-          <a:blip r:embed="rId6">
+          <a:blip r:embed="rId2">
             <a:lum/>
           </a:blip>
           <a:srcRect/>
@@ -928,10 +921,10 @@
       </p:grpSpPr>
       <p:sp>
         <p:nvSpPr>
-          <p:cNvPr id="2" name="Title Placeholder 1">
-            <a:extLst>
-              <a:ext uri="{FF2B5EF4-FFF2-40B4-BE49-F238E27FC236}">
-                <a16:creationId xmlns:a16="http://schemas.microsoft.com/office/drawing/2014/main" id="{AD40C5A8-72D0-4B08-8FDA-49B8D1F97D4C}"/>
+          <p:cNvPr id="2" name="Title 1">
+            <a:extLst>
+              <a:ext uri="{FF2B5EF4-FFF2-40B4-BE49-F238E27FC236}">
+                <a16:creationId xmlns:a16="http://schemas.microsoft.com/office/drawing/2014/main" id="{0ECBFABF-0FF7-46A7-A3E7-B6C1EFC20E36}"/>
               </a:ext>
             </a:extLst>
           </p:cNvPr>
@@ -942,6 +935,600 @@
             <p:ph type="title"/>
           </p:nvPr>
         </p:nvSpPr>
+        <p:spPr/>
+        <p:txBody>
+          <a:bodyPr/>
+          <a:lstStyle>
+            <a:lvl1pPr>
+              <a:defRPr>
+                <a:solidFill>
+                  <a:srgbClr val="171717"/>
+                </a:solidFill>
+              </a:defRPr>
+            </a:lvl1pPr>
+          </a:lstStyle>
+          <a:p>
+            <a:r>
+              <a:rPr lang="en-US"/>
+              <a:t>Click to edit Master title style</a:t>
+            </a:r>
+            <a:endParaRPr lang="en-CA"/>
+          </a:p>
+        </p:txBody>
+      </p:sp>
+      <p:sp>
+        <p:nvSpPr>
+          <p:cNvPr id="3" name="Content Placeholder 2">
+            <a:extLst>
+              <a:ext uri="{FF2B5EF4-FFF2-40B4-BE49-F238E27FC236}">
+                <a16:creationId xmlns:a16="http://schemas.microsoft.com/office/drawing/2014/main" id="{85D1B3E0-28C0-49B4-B789-CFB199546EE9}"/>
+              </a:ext>
+            </a:extLst>
+          </p:cNvPr>
+          <p:cNvSpPr>
+            <a:spLocks noGrp="1"/>
+          </p:cNvSpPr>
+          <p:nvPr>
+            <p:ph idx="1"/>
+          </p:nvPr>
+        </p:nvSpPr>
+        <p:spPr>
+          <a:xfrm>
+            <a:off x="838200" y="1825624"/>
+            <a:ext cx="10515600" cy="4835479"/>
+          </a:xfrm>
+          <a:prstGeom prst="rect">
+            <a:avLst/>
+          </a:prstGeom>
+        </p:spPr>
+        <p:txBody>
+          <a:bodyPr/>
+          <a:lstStyle>
+            <a:lvl1pPr>
+              <a:buClr>
+                <a:schemeClr val="accent2"/>
+              </a:buClr>
+              <a:defRPr>
+                <a:solidFill>
+                  <a:srgbClr val="171717"/>
+                </a:solidFill>
+              </a:defRPr>
+            </a:lvl1pPr>
+            <a:lvl2pPr>
+              <a:buClr>
+                <a:schemeClr val="accent2"/>
+              </a:buClr>
+              <a:defRPr>
+                <a:solidFill>
+                  <a:srgbClr val="171717"/>
+                </a:solidFill>
+              </a:defRPr>
+            </a:lvl2pPr>
+            <a:lvl3pPr>
+              <a:buClr>
+                <a:schemeClr val="accent2"/>
+              </a:buClr>
+              <a:defRPr>
+                <a:solidFill>
+                  <a:srgbClr val="171717"/>
+                </a:solidFill>
+              </a:defRPr>
+            </a:lvl3pPr>
+            <a:lvl4pPr>
+              <a:buClr>
+                <a:schemeClr val="accent2"/>
+              </a:buClr>
+              <a:defRPr>
+                <a:solidFill>
+                  <a:srgbClr val="171717"/>
+                </a:solidFill>
+              </a:defRPr>
+            </a:lvl4pPr>
+            <a:lvl5pPr>
+              <a:buClr>
+                <a:schemeClr val="accent2"/>
+              </a:buClr>
+              <a:defRPr>
+                <a:solidFill>
+                  <a:srgbClr val="171717"/>
+                </a:solidFill>
+              </a:defRPr>
+            </a:lvl5pPr>
+          </a:lstStyle>
+          <a:p>
+            <a:pPr lvl="0"/>
+            <a:r>
+              <a:rPr lang="en-US"/>
+              <a:t>Click to edit Master text styles</a:t>
+            </a:r>
+          </a:p>
+          <a:p>
+            <a:pPr lvl="1"/>
+            <a:r>
+              <a:rPr lang="en-US"/>
+              <a:t>Second level</a:t>
+            </a:r>
+          </a:p>
+          <a:p>
+            <a:pPr lvl="2"/>
+            <a:r>
+              <a:rPr lang="en-US"/>
+              <a:t>Third level</a:t>
+            </a:r>
+          </a:p>
+          <a:p>
+            <a:pPr lvl="3"/>
+            <a:r>
+              <a:rPr lang="en-US"/>
+              <a:t>Fourth level</a:t>
+            </a:r>
+          </a:p>
+          <a:p>
+            <a:pPr lvl="4"/>
+            <a:r>
+              <a:rPr lang="en-US"/>
+              <a:t>Fifth level</a:t>
+            </a:r>
+            <a:endParaRPr lang="en-CA" dirty="0"/>
+          </a:p>
+        </p:txBody>
+      </p:sp>
+    </p:spTree>
+    <p:extLst>
+      <p:ext uri="{BB962C8B-B14F-4D97-AF65-F5344CB8AC3E}">
+        <p14:creationId xmlns:p14="http://schemas.microsoft.com/office/powerpoint/2010/main" val="1149510527"/>
+      </p:ext>
+    </p:extLst>
+  </p:cSld>
+  <p:clrMapOvr>
+    <a:masterClrMapping/>
+  </p:clrMapOvr>
+</p:sldLayout>
+</file>
+
+<file path=ppt/slideLayouts/slideLayout6.xml><?xml version="1.0" encoding="utf-8"?>
+<p:sldLayout xmlns:a="http://schemas.openxmlformats.org/drawingml/2006/main" xmlns:r="http://schemas.openxmlformats.org/officeDocument/2006/relationships" xmlns:p="http://schemas.openxmlformats.org/presentationml/2006/main" type="obj" preserve="1">
+  <p:cSld name="5_Title and Content">
+    <p:bg>
+      <p:bgPr>
+        <a:blipFill dpi="0" rotWithShape="1">
+          <a:blip r:embed="rId2">
+            <a:lum/>
+          </a:blip>
+          <a:srcRect/>
+          <a:stretch>
+            <a:fillRect/>
+          </a:stretch>
+        </a:blipFill>
+        <a:effectLst/>
+      </p:bgPr>
+    </p:bg>
+    <p:spTree>
+      <p:nvGrpSpPr>
+        <p:cNvPr id="1" name=""/>
+        <p:cNvGrpSpPr/>
+        <p:nvPr/>
+      </p:nvGrpSpPr>
+      <p:grpSpPr>
+        <a:xfrm>
+          <a:off x="0" y="0"/>
+          <a:ext cx="0" cy="0"/>
+          <a:chOff x="0" y="0"/>
+          <a:chExt cx="0" cy="0"/>
+        </a:xfrm>
+      </p:grpSpPr>
+      <p:sp>
+        <p:nvSpPr>
+          <p:cNvPr id="2" name="Title 1">
+            <a:extLst>
+              <a:ext uri="{FF2B5EF4-FFF2-40B4-BE49-F238E27FC236}">
+                <a16:creationId xmlns:a16="http://schemas.microsoft.com/office/drawing/2014/main" id="{0ECBFABF-0FF7-46A7-A3E7-B6C1EFC20E36}"/>
+              </a:ext>
+            </a:extLst>
+          </p:cNvPr>
+          <p:cNvSpPr>
+            <a:spLocks noGrp="1"/>
+          </p:cNvSpPr>
+          <p:nvPr>
+            <p:ph type="title"/>
+          </p:nvPr>
+        </p:nvSpPr>
+        <p:spPr/>
+        <p:txBody>
+          <a:bodyPr/>
+          <a:lstStyle>
+            <a:lvl1pPr>
+              <a:defRPr>
+                <a:solidFill>
+                  <a:schemeClr val="tx1"/>
+                </a:solidFill>
+              </a:defRPr>
+            </a:lvl1pPr>
+          </a:lstStyle>
+          <a:p>
+            <a:r>
+              <a:rPr lang="en-US"/>
+              <a:t>Click to edit Master title style</a:t>
+            </a:r>
+            <a:endParaRPr lang="en-CA"/>
+          </a:p>
+        </p:txBody>
+      </p:sp>
+      <p:sp>
+        <p:nvSpPr>
+          <p:cNvPr id="3" name="Content Placeholder 2">
+            <a:extLst>
+              <a:ext uri="{FF2B5EF4-FFF2-40B4-BE49-F238E27FC236}">
+                <a16:creationId xmlns:a16="http://schemas.microsoft.com/office/drawing/2014/main" id="{85D1B3E0-28C0-49B4-B789-CFB199546EE9}"/>
+              </a:ext>
+            </a:extLst>
+          </p:cNvPr>
+          <p:cNvSpPr>
+            <a:spLocks noGrp="1"/>
+          </p:cNvSpPr>
+          <p:nvPr>
+            <p:ph idx="1"/>
+          </p:nvPr>
+        </p:nvSpPr>
+        <p:spPr>
+          <a:xfrm>
+            <a:off x="838200" y="1825624"/>
+            <a:ext cx="10515600" cy="4835479"/>
+          </a:xfrm>
+          <a:prstGeom prst="rect">
+            <a:avLst/>
+          </a:prstGeom>
+        </p:spPr>
+        <p:txBody>
+          <a:bodyPr/>
+          <a:lstStyle>
+            <a:lvl1pPr>
+              <a:buClr>
+                <a:schemeClr val="accent2"/>
+              </a:buClr>
+              <a:defRPr>
+                <a:solidFill>
+                  <a:schemeClr val="tx1"/>
+                </a:solidFill>
+              </a:defRPr>
+            </a:lvl1pPr>
+            <a:lvl2pPr>
+              <a:buClr>
+                <a:schemeClr val="accent2"/>
+              </a:buClr>
+              <a:defRPr>
+                <a:solidFill>
+                  <a:schemeClr val="tx1"/>
+                </a:solidFill>
+              </a:defRPr>
+            </a:lvl2pPr>
+            <a:lvl3pPr>
+              <a:buClr>
+                <a:schemeClr val="accent2"/>
+              </a:buClr>
+              <a:defRPr>
+                <a:solidFill>
+                  <a:schemeClr val="tx1"/>
+                </a:solidFill>
+              </a:defRPr>
+            </a:lvl3pPr>
+            <a:lvl4pPr>
+              <a:buClr>
+                <a:schemeClr val="accent2"/>
+              </a:buClr>
+              <a:defRPr>
+                <a:solidFill>
+                  <a:schemeClr val="tx1"/>
+                </a:solidFill>
+              </a:defRPr>
+            </a:lvl4pPr>
+            <a:lvl5pPr>
+              <a:buClr>
+                <a:schemeClr val="accent2"/>
+              </a:buClr>
+              <a:defRPr>
+                <a:solidFill>
+                  <a:schemeClr val="tx1"/>
+                </a:solidFill>
+              </a:defRPr>
+            </a:lvl5pPr>
+          </a:lstStyle>
+          <a:p>
+            <a:pPr lvl="0"/>
+            <a:r>
+              <a:rPr lang="en-US"/>
+              <a:t>Click to edit Master text styles</a:t>
+            </a:r>
+          </a:p>
+          <a:p>
+            <a:pPr lvl="1"/>
+            <a:r>
+              <a:rPr lang="en-US"/>
+              <a:t>Second level</a:t>
+            </a:r>
+          </a:p>
+          <a:p>
+            <a:pPr lvl="2"/>
+            <a:r>
+              <a:rPr lang="en-US"/>
+              <a:t>Third level</a:t>
+            </a:r>
+          </a:p>
+          <a:p>
+            <a:pPr lvl="3"/>
+            <a:r>
+              <a:rPr lang="en-US"/>
+              <a:t>Fourth level</a:t>
+            </a:r>
+          </a:p>
+          <a:p>
+            <a:pPr lvl="4"/>
+            <a:r>
+              <a:rPr lang="en-US"/>
+              <a:t>Fifth level</a:t>
+            </a:r>
+            <a:endParaRPr lang="en-CA" dirty="0"/>
+          </a:p>
+        </p:txBody>
+      </p:sp>
+    </p:spTree>
+    <p:extLst>
+      <p:ext uri="{BB962C8B-B14F-4D97-AF65-F5344CB8AC3E}">
+        <p14:creationId xmlns:p14="http://schemas.microsoft.com/office/powerpoint/2010/main" val="1034858832"/>
+      </p:ext>
+    </p:extLst>
+  </p:cSld>
+  <p:clrMapOvr>
+    <a:masterClrMapping/>
+  </p:clrMapOvr>
+</p:sldLayout>
+</file>
+
+<file path=ppt/slideLayouts/slideLayout7.xml><?xml version="1.0" encoding="utf-8"?>
+<p:sldLayout xmlns:a="http://schemas.openxmlformats.org/drawingml/2006/main" xmlns:r="http://schemas.openxmlformats.org/officeDocument/2006/relationships" xmlns:p="http://schemas.openxmlformats.org/presentationml/2006/main" type="obj" preserve="1">
+  <p:cSld name="6_Title and Content">
+    <p:bg>
+      <p:bgPr>
+        <a:blipFill dpi="0" rotWithShape="1">
+          <a:blip r:embed="rId2">
+            <a:lum/>
+          </a:blip>
+          <a:srcRect/>
+          <a:stretch>
+            <a:fillRect/>
+          </a:stretch>
+        </a:blipFill>
+        <a:effectLst/>
+      </p:bgPr>
+    </p:bg>
+    <p:spTree>
+      <p:nvGrpSpPr>
+        <p:cNvPr id="1" name=""/>
+        <p:cNvGrpSpPr/>
+        <p:nvPr/>
+      </p:nvGrpSpPr>
+      <p:grpSpPr>
+        <a:xfrm>
+          <a:off x="0" y="0"/>
+          <a:ext cx="0" cy="0"/>
+          <a:chOff x="0" y="0"/>
+          <a:chExt cx="0" cy="0"/>
+        </a:xfrm>
+      </p:grpSpPr>
+      <p:sp>
+        <p:nvSpPr>
+          <p:cNvPr id="2" name="Title 1">
+            <a:extLst>
+              <a:ext uri="{FF2B5EF4-FFF2-40B4-BE49-F238E27FC236}">
+                <a16:creationId xmlns:a16="http://schemas.microsoft.com/office/drawing/2014/main" id="{0ECBFABF-0FF7-46A7-A3E7-B6C1EFC20E36}"/>
+              </a:ext>
+            </a:extLst>
+          </p:cNvPr>
+          <p:cNvSpPr>
+            <a:spLocks noGrp="1"/>
+          </p:cNvSpPr>
+          <p:nvPr>
+            <p:ph type="title"/>
+          </p:nvPr>
+        </p:nvSpPr>
+        <p:spPr/>
+        <p:txBody>
+          <a:bodyPr/>
+          <a:lstStyle>
+            <a:lvl1pPr>
+              <a:defRPr>
+                <a:solidFill>
+                  <a:srgbClr val="FFFFFF"/>
+                </a:solidFill>
+              </a:defRPr>
+            </a:lvl1pPr>
+          </a:lstStyle>
+          <a:p>
+            <a:r>
+              <a:rPr lang="en-US"/>
+              <a:t>Click to edit Master title style</a:t>
+            </a:r>
+            <a:endParaRPr lang="en-CA"/>
+          </a:p>
+        </p:txBody>
+      </p:sp>
+      <p:sp>
+        <p:nvSpPr>
+          <p:cNvPr id="3" name="Content Placeholder 2">
+            <a:extLst>
+              <a:ext uri="{FF2B5EF4-FFF2-40B4-BE49-F238E27FC236}">
+                <a16:creationId xmlns:a16="http://schemas.microsoft.com/office/drawing/2014/main" id="{85D1B3E0-28C0-49B4-B789-CFB199546EE9}"/>
+              </a:ext>
+            </a:extLst>
+          </p:cNvPr>
+          <p:cNvSpPr>
+            <a:spLocks noGrp="1"/>
+          </p:cNvSpPr>
+          <p:nvPr>
+            <p:ph idx="1"/>
+          </p:nvPr>
+        </p:nvSpPr>
+        <p:spPr>
+          <a:xfrm>
+            <a:off x="838200" y="1825624"/>
+            <a:ext cx="10515600" cy="4835479"/>
+          </a:xfrm>
+          <a:prstGeom prst="rect">
+            <a:avLst/>
+          </a:prstGeom>
+        </p:spPr>
+        <p:txBody>
+          <a:bodyPr/>
+          <a:lstStyle>
+            <a:lvl1pPr>
+              <a:buClr>
+                <a:schemeClr val="accent2"/>
+              </a:buClr>
+              <a:defRPr>
+                <a:solidFill>
+                  <a:srgbClr val="FFFFFF"/>
+                </a:solidFill>
+              </a:defRPr>
+            </a:lvl1pPr>
+            <a:lvl2pPr>
+              <a:buClr>
+                <a:schemeClr val="accent2"/>
+              </a:buClr>
+              <a:defRPr>
+                <a:solidFill>
+                  <a:srgbClr val="FFFFFF"/>
+                </a:solidFill>
+              </a:defRPr>
+            </a:lvl2pPr>
+            <a:lvl3pPr>
+              <a:buClr>
+                <a:schemeClr val="accent2"/>
+              </a:buClr>
+              <a:defRPr>
+                <a:solidFill>
+                  <a:srgbClr val="FFFFFF"/>
+                </a:solidFill>
+              </a:defRPr>
+            </a:lvl3pPr>
+            <a:lvl4pPr>
+              <a:buClr>
+                <a:schemeClr val="accent2"/>
+              </a:buClr>
+              <a:defRPr>
+                <a:solidFill>
+                  <a:srgbClr val="FFFFFF"/>
+                </a:solidFill>
+              </a:defRPr>
+            </a:lvl4pPr>
+            <a:lvl5pPr>
+              <a:buClr>
+                <a:schemeClr val="accent2"/>
+              </a:buClr>
+              <a:defRPr>
+                <a:solidFill>
+                  <a:srgbClr val="FFFFFF"/>
+                </a:solidFill>
+              </a:defRPr>
+            </a:lvl5pPr>
+          </a:lstStyle>
+          <a:p>
+            <a:pPr lvl="0"/>
+            <a:r>
+              <a:rPr lang="en-US"/>
+              <a:t>Click to edit Master text styles</a:t>
+            </a:r>
+          </a:p>
+          <a:p>
+            <a:pPr lvl="1"/>
+            <a:r>
+              <a:rPr lang="en-US"/>
+              <a:t>Second level</a:t>
+            </a:r>
+          </a:p>
+          <a:p>
+            <a:pPr lvl="2"/>
+            <a:r>
+              <a:rPr lang="en-US"/>
+              <a:t>Third level</a:t>
+            </a:r>
+          </a:p>
+          <a:p>
+            <a:pPr lvl="3"/>
+            <a:r>
+              <a:rPr lang="en-US"/>
+              <a:t>Fourth level</a:t>
+            </a:r>
+          </a:p>
+          <a:p>
+            <a:pPr lvl="4"/>
+            <a:r>
+              <a:rPr lang="en-US"/>
+              <a:t>Fifth level</a:t>
+            </a:r>
+            <a:endParaRPr lang="en-CA" dirty="0"/>
+          </a:p>
+        </p:txBody>
+      </p:sp>
+    </p:spTree>
+    <p:extLst>
+      <p:ext uri="{BB962C8B-B14F-4D97-AF65-F5344CB8AC3E}">
+        <p14:creationId xmlns:p14="http://schemas.microsoft.com/office/powerpoint/2010/main" val="3228230879"/>
+      </p:ext>
+    </p:extLst>
+  </p:cSld>
+  <p:clrMapOvr>
+    <a:masterClrMapping/>
+  </p:clrMapOvr>
+</p:sldLayout>
+</file>
+
+<file path=ppt/slideMasters/slideMaster1.xml><?xml version="1.0" encoding="utf-8"?>
+<p:sldMaster xmlns:a="http://schemas.openxmlformats.org/drawingml/2006/main" xmlns:r="http://schemas.openxmlformats.org/officeDocument/2006/relationships" xmlns:p="http://schemas.openxmlformats.org/presentationml/2006/main">
+  <p:cSld>
+    <p:bg>
+      <p:bgPr>
+        <a:blipFill dpi="0" rotWithShape="1">
+          <a:blip r:embed="rId9">
+            <a:lum/>
+          </a:blip>
+          <a:srcRect/>
+          <a:stretch>
+            <a:fillRect/>
+          </a:stretch>
+        </a:blipFill>
+        <a:effectLst/>
+      </p:bgPr>
+    </p:bg>
+    <p:spTree>
+      <p:nvGrpSpPr>
+        <p:cNvPr id="1" name=""/>
+        <p:cNvGrpSpPr/>
+        <p:nvPr/>
+      </p:nvGrpSpPr>
+      <p:grpSpPr>
+        <a:xfrm>
+          <a:off x="0" y="0"/>
+          <a:ext cx="0" cy="0"/>
+          <a:chOff x="0" y="0"/>
+          <a:chExt cx="0" cy="0"/>
+        </a:xfrm>
+      </p:grpSpPr>
+      <p:sp>
+        <p:nvSpPr>
+          <p:cNvPr id="2" name="Title Placeholder 1">
+            <a:extLst>
+              <a:ext uri="{FF2B5EF4-FFF2-40B4-BE49-F238E27FC236}">
+                <a16:creationId xmlns:a16="http://schemas.microsoft.com/office/drawing/2014/main" id="{AD40C5A8-72D0-4B08-8FDA-49B8D1F97D4C}"/>
+              </a:ext>
+            </a:extLst>
+          </p:cNvPr>
+          <p:cNvSpPr>
+            <a:spLocks noGrp="1"/>
+          </p:cNvSpPr>
+          <p:nvPr>
+            <p:ph type="title"/>
+          </p:nvPr>
+        </p:nvSpPr>
         <p:spPr>
           <a:xfrm>
             <a:off x="838200" y="727514"/>
@@ -999,7 +1586,7 @@
             <a:pPr lvl="0"/>
             <a:r>
               <a:rPr lang="en-US"/>
-              <a:t>Edit Master text styles</a:t>
+              <a:t>Click to edit Master text styles</a:t>
             </a:r>
           </a:p>
           <a:p>
@@ -1036,16 +1623,19 @@
     </p:spTree>
     <p:extLst>
       <p:ext uri="{BB962C8B-B14F-4D97-AF65-F5344CB8AC3E}">
-        <p14:creationId xmlns:p14="http://schemas.microsoft.com/office/powerpoint/2010/main" val="2325685743"/>
+        <p14:creationId xmlns:p14="http://schemas.microsoft.com/office/powerpoint/2010/main" val="2050704679"/>
       </p:ext>
     </p:extLst>
   </p:cSld>
   <p:clrMap bg1="lt1" tx1="dk1" bg2="lt2" tx2="dk2" accent1="accent1" accent2="accent2" accent3="accent3" accent4="accent4" accent5="accent5" accent6="accent6" hlink="hlink" folHlink="folHlink"/>
   <p:sldLayoutIdLst>
-    <p:sldLayoutId id="2147483666" r:id="rId1"/>
-    <p:sldLayoutId id="2147483667" r:id="rId2"/>
-    <p:sldLayoutId id="2147483668" r:id="rId3"/>
-    <p:sldLayoutId id="2147483669" r:id="rId4"/>
+    <p:sldLayoutId id="2147483671" r:id="rId1"/>
+    <p:sldLayoutId id="2147483672" r:id="rId2"/>
+    <p:sldLayoutId id="2147483673" r:id="rId3"/>
+    <p:sldLayoutId id="2147483674" r:id="rId4"/>
+    <p:sldLayoutId id="2147483675" r:id="rId5"/>
+    <p:sldLayoutId id="2147483676" r:id="rId6"/>
+    <p:sldLayoutId id="2147483677" r:id="rId7"/>
   </p:sldLayoutIdLst>
   <p:txStyles>
     <p:titleStyle>
@@ -2843,12 +3433,7 @@
             <p:ph type="title"/>
           </p:nvPr>
         </p:nvSpPr>
-        <p:spPr>
-          <a:xfrm>
-            <a:off x="838200" y="727514"/>
-            <a:ext cx="10515600" cy="656148"/>
-          </a:xfrm>
-        </p:spPr>
+        <p:spPr/>
         <p:txBody>
           <a:bodyPr>
             <a:normAutofit fontScale="90000"/>
@@ -3325,12 +3910,7 @@
             <p:ph type="title"/>
           </p:nvPr>
         </p:nvSpPr>
-        <p:spPr>
-          <a:xfrm>
-            <a:off x="838200" y="727514"/>
-            <a:ext cx="10515600" cy="656148"/>
-          </a:xfrm>
-        </p:spPr>
+        <p:spPr/>
         <p:txBody>
           <a:bodyPr>
             <a:normAutofit fontScale="90000"/>
@@ -4148,12 +4728,7 @@
             <p:ph type="title"/>
           </p:nvPr>
         </p:nvSpPr>
-        <p:spPr>
-          <a:xfrm>
-            <a:off x="838200" y="727514"/>
-            <a:ext cx="10515600" cy="656148"/>
-          </a:xfrm>
-        </p:spPr>
+        <p:spPr/>
         <p:txBody>
           <a:bodyPr>
             <a:normAutofit fontScale="90000"/>
@@ -4971,12 +5546,7 @@
             <p:ph type="title"/>
           </p:nvPr>
         </p:nvSpPr>
-        <p:spPr>
-          <a:xfrm>
-            <a:off x="838200" y="727514"/>
-            <a:ext cx="10515600" cy="656148"/>
-          </a:xfrm>
-        </p:spPr>
+        <p:spPr/>
         <p:txBody>
           <a:bodyPr>
             <a:normAutofit fontScale="90000"/>
@@ -5794,12 +6364,7 @@
             <p:ph type="title"/>
           </p:nvPr>
         </p:nvSpPr>
-        <p:spPr>
-          <a:xfrm>
-            <a:off x="838200" y="727514"/>
-            <a:ext cx="10515600" cy="656148"/>
-          </a:xfrm>
-        </p:spPr>
+        <p:spPr/>
         <p:txBody>
           <a:bodyPr>
             <a:normAutofit fontScale="90000"/>
@@ -6793,12 +7358,7 @@
             <p:ph type="title"/>
           </p:nvPr>
         </p:nvSpPr>
-        <p:spPr>
-          <a:xfrm>
-            <a:off x="838200" y="727514"/>
-            <a:ext cx="10515600" cy="656148"/>
-          </a:xfrm>
-        </p:spPr>
+        <p:spPr/>
         <p:txBody>
           <a:bodyPr>
             <a:normAutofit fontScale="90000"/>
@@ -7156,7 +7716,7 @@
             <a:avLst/>
           </a:prstGeom>
           <a:solidFill>
-            <a:schemeClr val="bg1"/>
+            <a:srgbClr val="2D2D2D"/>
           </a:solidFill>
           <a:ln>
             <a:noFill/>
@@ -7851,12 +8411,7 @@
             <p:ph type="title"/>
           </p:nvPr>
         </p:nvSpPr>
-        <p:spPr>
-          <a:xfrm>
-            <a:off x="838200" y="727514"/>
-            <a:ext cx="10515600" cy="656148"/>
-          </a:xfrm>
-        </p:spPr>
+        <p:spPr/>
         <p:txBody>
           <a:bodyPr>
             <a:normAutofit fontScale="90000"/>
@@ -8490,12 +9045,7 @@
             <p:ph type="title"/>
           </p:nvPr>
         </p:nvSpPr>
-        <p:spPr>
-          <a:xfrm>
-            <a:off x="838200" y="727514"/>
-            <a:ext cx="10515600" cy="656148"/>
-          </a:xfrm>
-        </p:spPr>
+        <p:spPr/>
         <p:txBody>
           <a:bodyPr>
             <a:normAutofit fontScale="90000"/>
@@ -12065,9 +12615,9 @@
 </file>
 
 <file path=ppt/theme/theme1.xml><?xml version="1.0" encoding="utf-8"?>
-<a:theme xmlns:a="http://schemas.openxmlformats.org/drawingml/2006/main" name="APS106_PPTX_Theme">
+<a:theme xmlns:a="http://schemas.openxmlformats.org/drawingml/2006/main" name="APS106_Theme">
   <a:themeElements>
-    <a:clrScheme name="Custom 5">
+    <a:clrScheme name="Custom 2">
       <a:dk1>
         <a:srgbClr val="444445"/>
       </a:dk1>
@@ -12081,13 +12631,13 @@
         <a:srgbClr val="3D464D"/>
       </a:lt2>
       <a:accent1>
-        <a:srgbClr val="017EE5"/>
+        <a:srgbClr val="0061FF"/>
       </a:accent1>
       <a:accent2>
-        <a:srgbClr val="017EE5"/>
+        <a:srgbClr val="0061FF"/>
       </a:accent2>
       <a:accent3>
-        <a:srgbClr val="017EE5"/>
+        <a:srgbClr val="0061FF"/>
       </a:accent3>
       <a:accent4>
         <a:srgbClr val="7B8994"/>
@@ -12096,7 +12646,7 @@
         <a:srgbClr val="7B8994"/>
       </a:accent5>
       <a:accent6>
-        <a:srgbClr val="FF9933"/>
+        <a:srgbClr val="F7B41A"/>
       </a:accent6>
       <a:hlink>
         <a:srgbClr val="3D464D"/>
@@ -12259,7 +12809,7 @@
   <a:extraClrSchemeLst/>
   <a:extLst>
     <a:ext uri="{05A4C25C-085E-4340-85A3-A5531E510DB2}">
-      <thm15:themeFamily xmlns:thm15="http://schemas.microsoft.com/office/thememl/2012/main" name="APS106_PPTX_Theme" id="{D71ABBE9-7E6D-4E30-BD8F-2EB61EB32A2D}" vid="{056030BA-02C6-4208-ACCE-F1B550CC0AA4}"/>
+      <thm15:themeFamily xmlns:thm15="http://schemas.microsoft.com/office/thememl/2012/main" name="APS106_Theme" id="{3BEEB87C-8A6C-443F-995D-4A4893CCEBD8}" vid="{9B7A7CDB-8752-4A8C-8C1A-92E8A921146E}"/>
     </a:ext>
   </a:extLst>
 </a:theme>

</xml_diff>

<commit_message>
- Week 8.2 content
</commit_message>
<xml_diff>
--- a/lectures/week8/lecture1/slides/week8_lecture1.pptx
+++ b/lectures/week8/lecture1/slides/week8_lecture1.pptx
@@ -8352,16 +8352,13 @@
             <a:pPr lvl="1"/>
             <a:r>
               <a:rPr lang="en-US" dirty="0"/>
-              <a:t>Review for Midterm 2 </a:t>
-            </a:r>
-            <a:r>
-              <a:rPr lang="en-US" dirty="0">
-                <a:solidFill>
-                  <a:schemeClr val="accent6"/>
-                </a:solidFill>
-              </a:rPr>
-              <a:t>#jeopardy</a:t>
-            </a:r>
+              <a:t>Design Problem: Wordle Part 1</a:t>
+            </a:r>
+            <a:endParaRPr lang="en-US" dirty="0">
+              <a:solidFill>
+                <a:schemeClr val="accent6"/>
+              </a:solidFill>
+            </a:endParaRPr>
           </a:p>
         </p:txBody>
       </p:sp>

</xml_diff>